<commit_message>
Alteracoes blog post 20160926 e slides M3 C5
</commit_message>
<xml_diff>
--- a/curso/modulo3capitulo5.pptx
+++ b/curso/modulo3capitulo5.pptx
@@ -29,15 +29,16 @@
     <p:sldId id="448" r:id="rId24"/>
     <p:sldId id="461" r:id="rId25"/>
     <p:sldId id="462" r:id="rId26"/>
-    <p:sldId id="450" r:id="rId27"/>
-    <p:sldId id="460" r:id="rId28"/>
-    <p:sldId id="449" r:id="rId29"/>
-    <p:sldId id="472" r:id="rId30"/>
-    <p:sldId id="445" r:id="rId31"/>
-    <p:sldId id="446" r:id="rId32"/>
-    <p:sldId id="456" r:id="rId33"/>
-    <p:sldId id="447" r:id="rId34"/>
-    <p:sldId id="444" r:id="rId35"/>
+    <p:sldId id="501" r:id="rId27"/>
+    <p:sldId id="450" r:id="rId28"/>
+    <p:sldId id="460" r:id="rId29"/>
+    <p:sldId id="449" r:id="rId30"/>
+    <p:sldId id="472" r:id="rId31"/>
+    <p:sldId id="445" r:id="rId32"/>
+    <p:sldId id="446" r:id="rId33"/>
+    <p:sldId id="456" r:id="rId34"/>
+    <p:sldId id="447" r:id="rId35"/>
+    <p:sldId id="444" r:id="rId36"/>
   </p:sldIdLst>
   <p:sldSz cx="9144000" cy="6858000" type="screen4x3"/>
   <p:notesSz cx="6858000" cy="9144000"/>
@@ -4730,7 +4731,9 @@
         </p:nvSpPr>
         <p:spPr/>
         <p:txBody>
-          <a:bodyPr/>
+          <a:bodyPr>
+            <a:normAutofit fontScale="90000" lnSpcReduction="10000"/>
+          </a:bodyPr>
           <a:p>
             <a:r>
               <a:rPr lang="x-none" altLang="pt-BR"/>
@@ -4797,6 +4800,23 @@
               <a:t>: select, insert, update, delete, rule, references, trigger, create, temporary, execute e usage</a:t>
             </a:r>
             <a:endParaRPr lang="x-none" altLang="pt-BR"/>
+          </a:p>
+          <a:p>
+            <a:r>
+              <a:rPr lang="x-none" altLang="pt-BR">
+                <a:solidFill>
+                  <a:srgbClr val="00B0F0"/>
+                </a:solidFill>
+                <a:latin typeface="DejaVu Sans Mono" charset="0"/>
+              </a:rPr>
+              <a:t>grant all privileges on all tables in schema public to william</a:t>
+            </a:r>
+            <a:endParaRPr lang="x-none" altLang="pt-BR">
+              <a:solidFill>
+                <a:srgbClr val="00B0F0"/>
+              </a:solidFill>
+              <a:latin typeface="DejaVu Sans Mono" charset="0"/>
+            </a:endParaRPr>
           </a:p>
         </p:txBody>
       </p:sp>
@@ -6212,7 +6232,7 @@
           <a:p>
             <a:r>
               <a:rPr lang="x-none" altLang="pt-BR"/>
-              <a:t>Desempenho</a:t>
+              <a:t>Backup e Restauração</a:t>
             </a:r>
             <a:endParaRPr lang="x-none" altLang="pt-BR"/>
           </a:p>
@@ -6230,28 +6250,30 @@
         </p:nvSpPr>
         <p:spPr/>
         <p:txBody>
-          <a:bodyPr>
-            <a:normAutofit fontScale="90000" lnSpcReduction="10000"/>
-          </a:bodyPr>
-          <a:p>
+          <a:bodyPr/>
+          <a:p>
+            <a:r>
+              <a:rPr lang="x-none" altLang="pt-BR"/>
+              <a:t>Mas... não tem um jeito mais </a:t>
+            </a:r>
             <a:r>
               <a:rPr lang="x-none" altLang="pt-BR">
                 <a:solidFill>
                   <a:srgbClr val="92D050"/>
                 </a:solidFill>
               </a:rPr>
-              <a:t>PostgreSQL Tuning</a:t>
-            </a:r>
-            <a:r>
-              <a:rPr lang="x-none" altLang="pt-BR"/>
-              <a:t> é uma tarefa que pode ser complicada</a:t>
-            </a:r>
-            <a:endParaRPr lang="x-none" altLang="pt-BR"/>
-          </a:p>
-          <a:p>
-            <a:r>
-              <a:rPr lang="x-none" altLang="pt-BR"/>
-              <a:t>Depende muito da aplicação: </a:t>
+              <a:t>fácil</a:t>
+            </a:r>
+            <a:r>
+              <a:rPr lang="x-none" altLang="pt-BR"/>
+              <a:t>?</a:t>
+            </a:r>
+            <a:endParaRPr lang="x-none" altLang="pt-BR"/>
+          </a:p>
+          <a:p>
+            <a:r>
+              <a:rPr lang="x-none" altLang="pt-BR"/>
+              <a:t>Hoje o </a:t>
             </a:r>
             <a:r>
               <a:rPr lang="x-none" altLang="pt-BR">
@@ -6259,140 +6281,68 @@
                   <a:srgbClr val="92D050"/>
                 </a:solidFill>
               </a:rPr>
-              <a:t>não existe bala de prata!</a:t>
+              <a:t>OmniDB </a:t>
+            </a:r>
+            <a:r>
+              <a:rPr lang="x-none" altLang="pt-BR"/>
+              <a:t>consegue </a:t>
+            </a:r>
+            <a:r>
+              <a:rPr lang="x-none" altLang="pt-BR">
+                <a:solidFill>
+                  <a:srgbClr val="92D050"/>
+                </a:solidFill>
+              </a:rPr>
+              <a:t>converter</a:t>
+            </a:r>
+            <a:r>
+              <a:rPr lang="x-none" altLang="pt-BR"/>
+              <a:t> de qualquer SGBD suportado para qualquer SGBD suportado</a:t>
+            </a:r>
+            <a:endParaRPr lang="x-none" altLang="pt-BR"/>
+          </a:p>
+          <a:p>
+            <a:r>
+              <a:rPr lang="x-none" altLang="pt-BR"/>
+              <a:t>Por exemplo:</a:t>
+            </a:r>
+            <a:endParaRPr lang="x-none" altLang="pt-BR"/>
+          </a:p>
+          <a:p>
+            <a:pPr lvl="1"/>
+            <a:r>
+              <a:rPr lang="x-none" altLang="pt-BR"/>
+              <a:t>De PostgreSQL para SQLite</a:t>
+            </a:r>
+            <a:endParaRPr lang="x-none" altLang="pt-BR"/>
+          </a:p>
+          <a:p>
+            <a:pPr lvl="1"/>
+            <a:r>
+              <a:rPr lang="x-none" altLang="pt-BR"/>
+              <a:t>De SQLite para PostgreSQL</a:t>
+            </a:r>
+            <a:endParaRPr lang="x-none" altLang="pt-BR"/>
+          </a:p>
+          <a:p>
+            <a:pPr lvl="0"/>
+            <a:r>
+              <a:rPr lang="x-none" altLang="pt-BR"/>
+              <a:t>Futuramente lançaremos uma funcionalidade chamada </a:t>
+            </a:r>
+            <a:r>
+              <a:rPr lang="x-none" altLang="pt-BR">
+                <a:solidFill>
+                  <a:srgbClr val="92D050"/>
+                </a:solidFill>
+              </a:rPr>
+              <a:t>OmniDump</a:t>
             </a:r>
             <a:endParaRPr lang="x-none" altLang="pt-BR">
               <a:solidFill>
                 <a:srgbClr val="92D050"/>
               </a:solidFill>
             </a:endParaRPr>
-          </a:p>
-          <a:p>
-            <a:r>
-              <a:rPr lang="x-none" altLang="pt-BR"/>
-              <a:t>Alguns pontos:</a:t>
-            </a:r>
-            <a:endParaRPr lang="x-none" altLang="pt-BR"/>
-          </a:p>
-          <a:p>
-            <a:pPr lvl="1"/>
-            <a:r>
-              <a:rPr lang="x-none" altLang="pt-BR"/>
-              <a:t>Melhorias no código </a:t>
-            </a:r>
-            <a:r>
-              <a:rPr lang="x-none" altLang="pt-BR">
-                <a:solidFill>
-                  <a:srgbClr val="92D050"/>
-                </a:solidFill>
-              </a:rPr>
-              <a:t>SQL</a:t>
-            </a:r>
-            <a:endParaRPr lang="x-none" altLang="pt-BR">
-              <a:solidFill>
-                <a:srgbClr val="92D050"/>
-              </a:solidFill>
-            </a:endParaRPr>
-          </a:p>
-          <a:p>
-            <a:pPr lvl="1"/>
-            <a:r>
-              <a:rPr lang="x-none" altLang="pt-BR"/>
-              <a:t>Uso de Common Table Expressions (</a:t>
-            </a:r>
-            <a:r>
-              <a:rPr lang="x-none" altLang="pt-BR">
-                <a:solidFill>
-                  <a:srgbClr val="92D050"/>
-                </a:solidFill>
-              </a:rPr>
-              <a:t>CTEs</a:t>
-            </a:r>
-            <a:r>
-              <a:rPr lang="x-none" altLang="pt-BR"/>
-              <a:t>)</a:t>
-            </a:r>
-            <a:endParaRPr lang="x-none" altLang="pt-BR"/>
-          </a:p>
-          <a:p>
-            <a:pPr lvl="1"/>
-            <a:r>
-              <a:rPr lang="x-none" altLang="pt-BR"/>
-              <a:t>Limpeza do banco de dados com </a:t>
-            </a:r>
-            <a:r>
-              <a:rPr lang="x-none" altLang="pt-BR">
-                <a:solidFill>
-                  <a:srgbClr val="92D050"/>
-                </a:solidFill>
-              </a:rPr>
-              <a:t>vacuum</a:t>
-            </a:r>
-            <a:endParaRPr lang="x-none" altLang="pt-BR">
-              <a:solidFill>
-                <a:srgbClr val="92D050"/>
-              </a:solidFill>
-            </a:endParaRPr>
-          </a:p>
-          <a:p>
-            <a:pPr lvl="1"/>
-            <a:r>
-              <a:rPr lang="x-none" altLang="pt-BR"/>
-              <a:t>Análise da consulta lenta com </a:t>
-            </a:r>
-            <a:r>
-              <a:rPr lang="x-none" altLang="pt-BR">
-                <a:solidFill>
-                  <a:srgbClr val="92D050"/>
-                </a:solidFill>
-              </a:rPr>
-              <a:t>explain</a:t>
-            </a:r>
-            <a:endParaRPr lang="x-none" altLang="pt-BR">
-              <a:solidFill>
-                <a:srgbClr val="92D050"/>
-              </a:solidFill>
-            </a:endParaRPr>
-          </a:p>
-          <a:p>
-            <a:pPr lvl="1"/>
-            <a:r>
-              <a:rPr lang="x-none" altLang="pt-BR"/>
-              <a:t>Uso de </a:t>
-            </a:r>
-            <a:r>
-              <a:rPr lang="x-none" altLang="pt-BR">
-                <a:solidFill>
-                  <a:srgbClr val="92D050"/>
-                </a:solidFill>
-              </a:rPr>
-              <a:t>índices </a:t>
-            </a:r>
-            <a:r>
-              <a:rPr lang="x-none" altLang="pt-BR"/>
-              <a:t>para melhoria de consultas</a:t>
-            </a:r>
-            <a:endParaRPr lang="x-none" altLang="pt-BR"/>
-          </a:p>
-          <a:p>
-            <a:pPr lvl="1"/>
-            <a:r>
-              <a:rPr lang="x-none" altLang="pt-BR"/>
-              <a:t>Alterar </a:t>
-            </a:r>
-            <a:r>
-              <a:rPr lang="x-none" altLang="pt-BR">
-                <a:solidFill>
-                  <a:srgbClr val="92D050"/>
-                </a:solidFill>
-              </a:rPr>
-              <a:t>configurações </a:t>
-            </a:r>
-            <a:r>
-              <a:rPr lang="x-none" altLang="pt-BR"/>
-              <a:t>do PostgreSQL</a:t>
-            </a:r>
-            <a:endParaRPr lang="x-none" altLang="pt-BR"/>
           </a:p>
         </p:txBody>
       </p:sp>
@@ -6430,7 +6380,7 @@
           <a:p>
             <a:r>
               <a:rPr lang="x-none" altLang="pt-BR"/>
-              <a:t>Desempenho: SQL</a:t>
+              <a:t>Desempenho</a:t>
             </a:r>
             <a:endParaRPr lang="x-none" altLang="pt-BR"/>
           </a:p>
@@ -6449,40 +6399,166 @@
         <p:spPr/>
         <p:txBody>
           <a:bodyPr>
-            <a:normAutofit lnSpcReduction="20000"/>
+            <a:normAutofit fontScale="90000" lnSpcReduction="10000"/>
           </a:bodyPr>
           <a:p>
             <a:r>
-              <a:rPr lang="x-none" altLang="pt-BR"/>
-              <a:t>Use subconsultas somente como uma tabela (no from e no join)</a:t>
-            </a:r>
-            <a:endParaRPr lang="x-none" altLang="pt-BR"/>
-          </a:p>
-          <a:p>
-            <a:r>
-              <a:rPr lang="x-none" altLang="pt-BR"/>
-              <a:t>Sempre que houver um atributo constante e puder fazer subconsulta no from ou no join, faça</a:t>
-            </a:r>
-            <a:endParaRPr lang="x-none" altLang="pt-BR"/>
-          </a:p>
-          <a:p>
-            <a:r>
-              <a:rPr lang="x-none" altLang="pt-BR"/>
-              <a:t>Procure fazer joins de apenas 1 atributo</a:t>
-            </a:r>
-            <a:endParaRPr lang="x-none" altLang="pt-BR"/>
-          </a:p>
-          <a:p>
-            <a:r>
-              <a:rPr lang="x-none" altLang="pt-BR"/>
-              <a:t>Ordene os joins em ordem de número de registros, do maior para o menor</a:t>
-            </a:r>
-            <a:endParaRPr lang="x-none" altLang="pt-BR"/>
-          </a:p>
-          <a:p>
-            <a:r>
-              <a:rPr lang="x-none" altLang="pt-BR"/>
-              <a:t>Procure não usar mais do que 7 joins (8 tabelas) em uma mesma consulta</a:t>
+              <a:rPr lang="x-none" altLang="pt-BR">
+                <a:solidFill>
+                  <a:srgbClr val="92D050"/>
+                </a:solidFill>
+              </a:rPr>
+              <a:t>PostgreSQL Tuning</a:t>
+            </a:r>
+            <a:r>
+              <a:rPr lang="x-none" altLang="pt-BR"/>
+              <a:t> é uma tarefa que pode ser complicada</a:t>
+            </a:r>
+            <a:endParaRPr lang="x-none" altLang="pt-BR"/>
+          </a:p>
+          <a:p>
+            <a:r>
+              <a:rPr lang="x-none" altLang="pt-BR"/>
+              <a:t>Depende muito da aplicação: </a:t>
+            </a:r>
+            <a:r>
+              <a:rPr lang="x-none" altLang="pt-BR">
+                <a:solidFill>
+                  <a:srgbClr val="92D050"/>
+                </a:solidFill>
+              </a:rPr>
+              <a:t>não existe bala de prata!</a:t>
+            </a:r>
+            <a:endParaRPr lang="x-none" altLang="pt-BR">
+              <a:solidFill>
+                <a:srgbClr val="92D050"/>
+              </a:solidFill>
+            </a:endParaRPr>
+          </a:p>
+          <a:p>
+            <a:r>
+              <a:rPr lang="x-none" altLang="pt-BR"/>
+              <a:t>Alguns pontos:</a:t>
+            </a:r>
+            <a:endParaRPr lang="x-none" altLang="pt-BR"/>
+          </a:p>
+          <a:p>
+            <a:pPr lvl="1"/>
+            <a:r>
+              <a:rPr lang="x-none" altLang="pt-BR"/>
+              <a:t>Melhorias no código </a:t>
+            </a:r>
+            <a:r>
+              <a:rPr lang="x-none" altLang="pt-BR">
+                <a:solidFill>
+                  <a:srgbClr val="92D050"/>
+                </a:solidFill>
+              </a:rPr>
+              <a:t>SQL</a:t>
+            </a:r>
+            <a:endParaRPr lang="x-none" altLang="pt-BR">
+              <a:solidFill>
+                <a:srgbClr val="92D050"/>
+              </a:solidFill>
+            </a:endParaRPr>
+          </a:p>
+          <a:p>
+            <a:pPr lvl="1"/>
+            <a:r>
+              <a:rPr lang="x-none" altLang="pt-BR"/>
+              <a:t>Uso de Common Table Expressions (</a:t>
+            </a:r>
+            <a:r>
+              <a:rPr lang="x-none" altLang="pt-BR">
+                <a:solidFill>
+                  <a:srgbClr val="92D050"/>
+                </a:solidFill>
+              </a:rPr>
+              <a:t>CTEs</a:t>
+            </a:r>
+            <a:r>
+              <a:rPr lang="x-none" altLang="pt-BR"/>
+              <a:t>)</a:t>
+            </a:r>
+            <a:endParaRPr lang="x-none" altLang="pt-BR"/>
+          </a:p>
+          <a:p>
+            <a:pPr lvl="1"/>
+            <a:r>
+              <a:rPr lang="x-none" altLang="pt-BR"/>
+              <a:t>Limpeza do banco de dados com </a:t>
+            </a:r>
+            <a:r>
+              <a:rPr lang="x-none" altLang="pt-BR">
+                <a:solidFill>
+                  <a:srgbClr val="92D050"/>
+                </a:solidFill>
+              </a:rPr>
+              <a:t>vacuum</a:t>
+            </a:r>
+            <a:endParaRPr lang="x-none" altLang="pt-BR">
+              <a:solidFill>
+                <a:srgbClr val="92D050"/>
+              </a:solidFill>
+            </a:endParaRPr>
+          </a:p>
+          <a:p>
+            <a:pPr lvl="1"/>
+            <a:r>
+              <a:rPr lang="x-none" altLang="pt-BR"/>
+              <a:t>Análise da consulta lenta com </a:t>
+            </a:r>
+            <a:r>
+              <a:rPr lang="x-none" altLang="pt-BR">
+                <a:solidFill>
+                  <a:srgbClr val="92D050"/>
+                </a:solidFill>
+              </a:rPr>
+              <a:t>explain</a:t>
+            </a:r>
+            <a:endParaRPr lang="x-none" altLang="pt-BR">
+              <a:solidFill>
+                <a:srgbClr val="92D050"/>
+              </a:solidFill>
+            </a:endParaRPr>
+          </a:p>
+          <a:p>
+            <a:pPr lvl="1"/>
+            <a:r>
+              <a:rPr lang="x-none" altLang="pt-BR"/>
+              <a:t>Uso de </a:t>
+            </a:r>
+            <a:r>
+              <a:rPr lang="x-none" altLang="pt-BR">
+                <a:solidFill>
+                  <a:srgbClr val="92D050"/>
+                </a:solidFill>
+              </a:rPr>
+              <a:t>índices </a:t>
+            </a:r>
+            <a:r>
+              <a:rPr lang="x-none" altLang="pt-BR"/>
+              <a:t>para melhoria de consultas</a:t>
+            </a:r>
+            <a:endParaRPr lang="x-none" altLang="pt-BR"/>
+          </a:p>
+          <a:p>
+            <a:pPr lvl="1"/>
+            <a:r>
+              <a:rPr lang="x-none" altLang="pt-BR"/>
+              <a:t>Alterar </a:t>
+            </a:r>
+            <a:r>
+              <a:rPr lang="x-none" altLang="pt-BR">
+                <a:solidFill>
+                  <a:srgbClr val="92D050"/>
+                </a:solidFill>
+              </a:rPr>
+              <a:t>configurações </a:t>
+            </a:r>
+            <a:r>
+              <a:rPr lang="x-none" altLang="pt-BR"/>
+              <a:t>do PostgreSQL</a:t>
             </a:r>
             <a:endParaRPr lang="x-none" altLang="pt-BR"/>
           </a:p>
@@ -6522,7 +6598,7 @@
           <a:p>
             <a:r>
               <a:rPr lang="x-none" altLang="pt-BR"/>
-              <a:t>Desempenho: CTEs</a:t>
+              <a:t>Desempenho: SQL</a:t>
             </a:r>
             <a:endParaRPr lang="x-none" altLang="pt-BR"/>
           </a:p>
@@ -6540,9 +6616,43 @@
         </p:nvSpPr>
         <p:spPr/>
         <p:txBody>
-          <a:bodyPr/>
-          <a:p>
-            <a:endParaRPr lang="pt-BR" altLang="en-US"/>
+          <a:bodyPr>
+            <a:normAutofit lnSpcReduction="20000"/>
+          </a:bodyPr>
+          <a:p>
+            <a:r>
+              <a:rPr lang="x-none" altLang="pt-BR"/>
+              <a:t>Use subconsultas somente como uma tabela (no from e no join)</a:t>
+            </a:r>
+            <a:endParaRPr lang="x-none" altLang="pt-BR"/>
+          </a:p>
+          <a:p>
+            <a:r>
+              <a:rPr lang="x-none" altLang="pt-BR"/>
+              <a:t>Sempre que houver um atributo constante e puder fazer subconsulta no from ou no join, faça</a:t>
+            </a:r>
+            <a:endParaRPr lang="x-none" altLang="pt-BR"/>
+          </a:p>
+          <a:p>
+            <a:r>
+              <a:rPr lang="x-none" altLang="pt-BR"/>
+              <a:t>Procure fazer joins de apenas 1 atributo</a:t>
+            </a:r>
+            <a:endParaRPr lang="x-none" altLang="pt-BR"/>
+          </a:p>
+          <a:p>
+            <a:r>
+              <a:rPr lang="x-none" altLang="pt-BR"/>
+              <a:t>Ordene os joins em ordem de número de registros, do maior para o menor</a:t>
+            </a:r>
+            <a:endParaRPr lang="x-none" altLang="pt-BR"/>
+          </a:p>
+          <a:p>
+            <a:r>
+              <a:rPr lang="x-none" altLang="pt-BR"/>
+              <a:t>Procure não usar mais do que 7 joins (8 tabelas) em uma mesma consulta</a:t>
+            </a:r>
+            <a:endParaRPr lang="x-none" altLang="pt-BR"/>
           </a:p>
         </p:txBody>
       </p:sp>
@@ -6580,7 +6690,7 @@
           <a:p>
             <a:r>
               <a:rPr lang="x-none" altLang="pt-BR"/>
-              <a:t>Desempenho: Vacuum</a:t>
+              <a:t>Desempenho: CTEs</a:t>
             </a:r>
             <a:endParaRPr lang="x-none" altLang="pt-BR"/>
           </a:p>
@@ -6638,7 +6748,7 @@
           <a:p>
             <a:r>
               <a:rPr lang="x-none" altLang="pt-BR"/>
-              <a:t>Desempenho: Explain</a:t>
+              <a:t>Desempenho: Vacuum</a:t>
             </a:r>
             <a:endParaRPr lang="x-none" altLang="pt-BR"/>
           </a:p>
@@ -6809,7 +6919,7 @@
           <a:p>
             <a:r>
               <a:rPr lang="x-none" altLang="pt-BR"/>
-              <a:t>Desempenho: Índices</a:t>
+              <a:t>Desempenho: Explain</a:t>
             </a:r>
             <a:endParaRPr lang="x-none" altLang="pt-BR"/>
           </a:p>
@@ -6867,7 +6977,7 @@
           <a:p>
             <a:r>
               <a:rPr lang="x-none" altLang="pt-BR"/>
-              <a:t>Desempenho: Configuração</a:t>
+              <a:t>Desempenho: Índices</a:t>
             </a:r>
             <a:endParaRPr lang="x-none" altLang="pt-BR"/>
           </a:p>
@@ -6885,99 +6995,9 @@
         </p:nvSpPr>
         <p:spPr/>
         <p:txBody>
-          <a:bodyPr>
-            <a:normAutofit fontScale="90000"/>
-          </a:bodyPr>
-          <a:p>
-            <a:r>
-              <a:rPr lang="x-none" altLang="pt-BR"/>
-              <a:t>Alguns atributos do arquivo </a:t>
-            </a:r>
-            <a:r>
-              <a:rPr lang="x-none" altLang="pt-BR">
-                <a:solidFill>
-                  <a:srgbClr val="92D050"/>
-                </a:solidFill>
-              </a:rPr>
-              <a:t>postgresql.conf</a:t>
-            </a:r>
-            <a:r>
-              <a:rPr lang="x-none" altLang="pt-BR"/>
-              <a:t>:</a:t>
-            </a:r>
-            <a:endParaRPr lang="x-none" altLang="pt-BR"/>
-          </a:p>
-          <a:p>
-            <a:pPr lvl="1"/>
-            <a:r>
-              <a:rPr lang="x-none" altLang="pt-BR"/>
-              <a:t>listen_addresses</a:t>
-            </a:r>
-            <a:endParaRPr lang="x-none" altLang="pt-BR"/>
-          </a:p>
-          <a:p>
-            <a:pPr lvl="1"/>
-            <a:r>
-              <a:rPr lang="x-none" altLang="pt-BR"/>
-              <a:t>max_connections</a:t>
-            </a:r>
-            <a:endParaRPr lang="x-none" altLang="pt-BR"/>
-          </a:p>
-          <a:p>
-            <a:pPr lvl="1"/>
-            <a:r>
-              <a:rPr lang="x-none" altLang="pt-BR"/>
-              <a:t>effective_cache_size</a:t>
-            </a:r>
-            <a:endParaRPr lang="x-none" altLang="pt-BR"/>
-          </a:p>
-          <a:p>
-            <a:pPr lvl="1"/>
-            <a:r>
-              <a:rPr lang="x-none" altLang="pt-BR"/>
-              <a:t>shared_buffers</a:t>
-            </a:r>
-            <a:endParaRPr lang="x-none" altLang="pt-BR"/>
-          </a:p>
-          <a:p>
-            <a:pPr lvl="1"/>
-            <a:r>
-              <a:rPr lang="x-none" altLang="pt-BR"/>
-              <a:t>work_mem</a:t>
-            </a:r>
-            <a:endParaRPr lang="x-none" altLang="pt-BR"/>
-          </a:p>
-          <a:p>
-            <a:pPr lvl="1"/>
-            <a:r>
-              <a:rPr lang="x-none" altLang="pt-BR"/>
-              <a:t>maintenance_work_mem</a:t>
-            </a:r>
-            <a:endParaRPr lang="x-none" altLang="pt-BR"/>
-          </a:p>
-          <a:p>
-            <a:pPr lvl="1"/>
-            <a:endParaRPr lang="x-none" altLang="pt-BR"/>
-          </a:p>
-          <a:p>
-            <a:pPr lvl="0"/>
-            <a:r>
-              <a:rPr lang="x-none" altLang="pt-BR"/>
-              <a:t>Ferramenta de configuração automática: </a:t>
-            </a:r>
-            <a:r>
-              <a:rPr lang="x-none" altLang="pt-BR">
-                <a:solidFill>
-                  <a:srgbClr val="92D050"/>
-                </a:solidFill>
-              </a:rPr>
-              <a:t>www.pgconfig.org</a:t>
-            </a:r>
-            <a:r>
-              <a:rPr lang="x-none" altLang="pt-BR"/>
-              <a:t> (Sebastian Webber)</a:t>
-            </a:r>
-            <a:endParaRPr lang="x-none" altLang="pt-BR"/>
+          <a:bodyPr/>
+          <a:p>
+            <a:endParaRPr lang="pt-BR" altLang="en-US"/>
           </a:p>
         </p:txBody>
       </p:sp>
@@ -7015,7 +7035,7 @@
           <a:p>
             <a:r>
               <a:rPr lang="x-none" altLang="pt-BR"/>
-              <a:t>Funções Customizadas</a:t>
+              <a:t>Desempenho: Configuração</a:t>
             </a:r>
             <a:endParaRPr lang="x-none" altLang="pt-BR"/>
           </a:p>
@@ -7033,9 +7053,99 @@
         </p:nvSpPr>
         <p:spPr/>
         <p:txBody>
-          <a:bodyPr/>
-          <a:p>
-            <a:endParaRPr lang="pt-BR" altLang="en-US"/>
+          <a:bodyPr>
+            <a:normAutofit fontScale="90000"/>
+          </a:bodyPr>
+          <a:p>
+            <a:r>
+              <a:rPr lang="x-none" altLang="pt-BR"/>
+              <a:t>Alguns atributos do arquivo </a:t>
+            </a:r>
+            <a:r>
+              <a:rPr lang="x-none" altLang="pt-BR">
+                <a:solidFill>
+                  <a:srgbClr val="92D050"/>
+                </a:solidFill>
+              </a:rPr>
+              <a:t>postgresql.conf</a:t>
+            </a:r>
+            <a:r>
+              <a:rPr lang="x-none" altLang="pt-BR"/>
+              <a:t>:</a:t>
+            </a:r>
+            <a:endParaRPr lang="x-none" altLang="pt-BR"/>
+          </a:p>
+          <a:p>
+            <a:pPr lvl="1"/>
+            <a:r>
+              <a:rPr lang="x-none" altLang="pt-BR"/>
+              <a:t>listen_addresses</a:t>
+            </a:r>
+            <a:endParaRPr lang="x-none" altLang="pt-BR"/>
+          </a:p>
+          <a:p>
+            <a:pPr lvl="1"/>
+            <a:r>
+              <a:rPr lang="x-none" altLang="pt-BR"/>
+              <a:t>max_connections</a:t>
+            </a:r>
+            <a:endParaRPr lang="x-none" altLang="pt-BR"/>
+          </a:p>
+          <a:p>
+            <a:pPr lvl="1"/>
+            <a:r>
+              <a:rPr lang="x-none" altLang="pt-BR"/>
+              <a:t>effective_cache_size</a:t>
+            </a:r>
+            <a:endParaRPr lang="x-none" altLang="pt-BR"/>
+          </a:p>
+          <a:p>
+            <a:pPr lvl="1"/>
+            <a:r>
+              <a:rPr lang="x-none" altLang="pt-BR"/>
+              <a:t>shared_buffers</a:t>
+            </a:r>
+            <a:endParaRPr lang="x-none" altLang="pt-BR"/>
+          </a:p>
+          <a:p>
+            <a:pPr lvl="1"/>
+            <a:r>
+              <a:rPr lang="x-none" altLang="pt-BR"/>
+              <a:t>work_mem</a:t>
+            </a:r>
+            <a:endParaRPr lang="x-none" altLang="pt-BR"/>
+          </a:p>
+          <a:p>
+            <a:pPr lvl="1"/>
+            <a:r>
+              <a:rPr lang="x-none" altLang="pt-BR"/>
+              <a:t>maintenance_work_mem</a:t>
+            </a:r>
+            <a:endParaRPr lang="x-none" altLang="pt-BR"/>
+          </a:p>
+          <a:p>
+            <a:pPr lvl="1"/>
+            <a:endParaRPr lang="x-none" altLang="pt-BR"/>
+          </a:p>
+          <a:p>
+            <a:pPr lvl="0"/>
+            <a:r>
+              <a:rPr lang="x-none" altLang="pt-BR"/>
+              <a:t>Ferramenta de configuração automática: </a:t>
+            </a:r>
+            <a:r>
+              <a:rPr lang="x-none" altLang="pt-BR">
+                <a:solidFill>
+                  <a:srgbClr val="92D050"/>
+                </a:solidFill>
+              </a:rPr>
+              <a:t>www.pgconfig.org</a:t>
+            </a:r>
+            <a:r>
+              <a:rPr lang="x-none" altLang="pt-BR"/>
+              <a:t> (Sebastian Webber)</a:t>
+            </a:r>
+            <a:endParaRPr lang="x-none" altLang="pt-BR"/>
           </a:p>
         </p:txBody>
       </p:sp>
@@ -7073,6 +7183,64 @@
           <a:p>
             <a:r>
               <a:rPr lang="x-none" altLang="pt-BR"/>
+              <a:t>Funções Customizadas</a:t>
+            </a:r>
+            <a:endParaRPr lang="x-none" altLang="pt-BR"/>
+          </a:p>
+        </p:txBody>
+      </p:sp>
+      <p:sp>
+        <p:nvSpPr>
+          <p:cNvPr id="3" name="Content Placeholder 2"/>
+          <p:cNvSpPr>
+            <a:spLocks noGrp="1"/>
+          </p:cNvSpPr>
+          <p:nvPr>
+            <p:ph idx="1"/>
+          </p:nvPr>
+        </p:nvSpPr>
+        <p:spPr/>
+        <p:txBody>
+          <a:bodyPr/>
+          <a:p>
+            <a:endParaRPr lang="pt-BR" altLang="en-US"/>
+          </a:p>
+        </p:txBody>
+      </p:sp>
+    </p:spTree>
+  </p:cSld>
+  <p:clrMapOvr>
+    <a:masterClrMapping/>
+  </p:clrMapOvr>
+</p:sld>
+</file>
+
+<file path=ppt/slides/slide34.xml><?xml version="1.0" encoding="utf-8"?>
+<p:sld xmlns:a="http://schemas.openxmlformats.org/drawingml/2006/main" xmlns:r="http://schemas.openxmlformats.org/officeDocument/2006/relationships" xmlns:p="http://schemas.openxmlformats.org/presentationml/2006/main">
+  <p:cSld>
+    <p:spTree>
+      <p:nvGrpSpPr>
+        <p:cNvPr id="1" name=""/>
+        <p:cNvGrpSpPr/>
+        <p:nvPr/>
+      </p:nvGrpSpPr>
+      <p:grpSpPr/>
+      <p:sp>
+        <p:nvSpPr>
+          <p:cNvPr id="2" name="Title 1"/>
+          <p:cNvSpPr>
+            <a:spLocks noGrp="1"/>
+          </p:cNvSpPr>
+          <p:nvPr>
+            <p:ph type="title"/>
+          </p:nvPr>
+        </p:nvSpPr>
+        <p:spPr/>
+        <p:txBody>
+          <a:bodyPr/>
+          <a:p>
+            <a:r>
+              <a:rPr lang="x-none" altLang="pt-BR"/>
               <a:t>Outras Funcionalidades</a:t>
             </a:r>
             <a:endParaRPr lang="x-none" altLang="pt-BR"/>
@@ -7092,7 +7260,7 @@
         <p:spPr/>
         <p:txBody>
           <a:bodyPr>
-            <a:normAutofit fontScale="60000"/>
+            <a:normAutofit fontScale="50000"/>
           </a:bodyPr>
           <a:p>
             <a:r>
@@ -7203,7 +7371,21 @@
           <a:p>
             <a:r>
               <a:rPr lang="x-none" altLang="pt-BR"/>
+              <a:t>DBLink</a:t>
+            </a:r>
+            <a:endParaRPr lang="x-none" altLang="pt-BR"/>
+          </a:p>
+          <a:p>
+            <a:r>
+              <a:rPr lang="x-none" altLang="pt-BR"/>
               <a:t>Replicação de bancos em servidores diferentes (Hot StandBy)</a:t>
+            </a:r>
+            <a:endParaRPr lang="x-none" altLang="pt-BR"/>
+          </a:p>
+          <a:p>
+            <a:r>
+              <a:rPr lang="x-none" altLang="pt-BR"/>
+              <a:t>Execução de consultas em paralelo (9.6)</a:t>
             </a:r>
             <a:endParaRPr lang="x-none" altLang="pt-BR"/>
           </a:p>
@@ -7702,7 +7884,7 @@
         <p:spPr/>
         <p:txBody>
           <a:bodyPr>
-            <a:normAutofit lnSpcReduction="20000"/>
+            <a:normAutofit fontScale="70000"/>
           </a:bodyPr>
           <a:p>
             <a:r>
@@ -7846,6 +8028,42 @@
                 <a:latin typeface="DejaVu Sans Mono" charset="0"/>
               </a:rPr>
               <a:t>service postgresql restart</a:t>
+            </a:r>
+            <a:endParaRPr lang="x-none" altLang="pt-BR">
+              <a:solidFill>
+                <a:srgbClr val="00B0F0"/>
+              </a:solidFill>
+              <a:latin typeface="DejaVu Sans Mono" charset="0"/>
+            </a:endParaRPr>
+          </a:p>
+          <a:p>
+            <a:pPr lvl="0"/>
+            <a:r>
+              <a:rPr lang="x-none" altLang="pt-BR">
+                <a:solidFill>
+                  <a:srgbClr val="00B0F0"/>
+                </a:solidFill>
+                <a:latin typeface="DejaVu Sans Mono" charset="0"/>
+              </a:rPr>
+              <a:t>service postgresql stop</a:t>
+            </a:r>
+            <a:endParaRPr lang="x-none" altLang="pt-BR">
+              <a:solidFill>
+                <a:srgbClr val="00B0F0"/>
+              </a:solidFill>
+              <a:latin typeface="DejaVu Sans Mono" charset="0"/>
+            </a:endParaRPr>
+          </a:p>
+          <a:p>
+            <a:pPr lvl="0"/>
+            <a:r>
+              <a:rPr lang="x-none" altLang="pt-BR">
+                <a:solidFill>
+                  <a:srgbClr val="00B0F0"/>
+                </a:solidFill>
+                <a:latin typeface="DejaVu Sans Mono" charset="0"/>
+              </a:rPr>
+              <a:t>service postgresql start</a:t>
             </a:r>
             <a:endParaRPr lang="x-none" altLang="pt-BR">
               <a:solidFill>

</xml_diff>